<commit_message>
Just updated it for final sprint activities as per semester schedule
</commit_message>
<xml_diff>
--- a/presentation/Project_Presentation.pptx
+++ b/presentation/Project_Presentation.pptx
@@ -122,8 +122,8 @@
 <file path=ppt/revisionInfo.xml><?xml version="1.0" encoding="utf-8"?>
 <p1510:revInfo xmlns:a="http://schemas.openxmlformats.org/drawingml/2006/main" xmlns:r="http://schemas.openxmlformats.org/officeDocument/2006/relationships" xmlns:p1510="http://schemas.microsoft.com/office/powerpoint/2015/10/main">
   <p1510:revLst>
+    <p1510:client id="{59774C1C-9BE2-43E0-A4B7-74DF345FC88F}" v="111" dt="2018-03-12T20:34:03.807"/>
     <p1510:client id="{E715300B-5F82-46A8-982F-D7099BC209F3}" v="44" dt="2018-03-12T20:36:34.329"/>
-    <p1510:client id="{59774C1C-9BE2-43E0-A4B7-74DF345FC88F}" v="111" dt="2018-03-12T20:34:03.807"/>
   </p1510:revLst>
 </p1510:revInfo>
 </file>
@@ -841,7 +841,7 @@
             <a:fld id="{87DE6118-2437-4B30-8E3C-4D2BE6020583}" type="datetimeFigureOut">
               <a:rPr lang="en-US" dirty="0"/>
               <a:pPr/>
-              <a:t>3/19/18</a:t>
+              <a:t>4/8/18</a:t>
             </a:fld>
             <a:endParaRPr lang="en-US"/>
           </a:p>
@@ -1165,7 +1165,7 @@
           <a:p>
             <a:fld id="{87DE6118-2437-4B30-8E3C-4D2BE6020583}" type="datetimeFigureOut">
               <a:rPr lang="en-US" dirty="0"/>
-              <a:t>3/19/18</a:t>
+              <a:t>4/8/18</a:t>
             </a:fld>
             <a:endParaRPr lang="en-US"/>
           </a:p>
@@ -1338,7 +1338,7 @@
           <a:p>
             <a:fld id="{87DE6118-2437-4B30-8E3C-4D2BE6020583}" type="datetimeFigureOut">
               <a:rPr lang="en-US" dirty="0"/>
-              <a:t>3/19/18</a:t>
+              <a:t>4/8/18</a:t>
             </a:fld>
             <a:endParaRPr lang="en-US"/>
           </a:p>
@@ -1501,7 +1501,7 @@
           <a:p>
             <a:fld id="{87DE6118-2437-4B30-8E3C-4D2BE6020583}" type="datetimeFigureOut">
               <a:rPr lang="en-US" dirty="0"/>
-              <a:t>3/19/18</a:t>
+              <a:t>4/8/18</a:t>
             </a:fld>
             <a:endParaRPr lang="en-US"/>
           </a:p>
@@ -1773,7 +1773,7 @@
             <a:fld id="{87DE6118-2437-4B30-8E3C-4D2BE6020583}" type="datetimeFigureOut">
               <a:rPr lang="en-US" dirty="0"/>
               <a:pPr/>
-              <a:t>3/19/18</a:t>
+              <a:t>4/8/18</a:t>
             </a:fld>
             <a:endParaRPr lang="en-US"/>
           </a:p>
@@ -2160,7 +2160,7 @@
           <a:p>
             <a:fld id="{87DE6118-2437-4B30-8E3C-4D2BE6020583}" type="datetimeFigureOut">
               <a:rPr lang="en-US" dirty="0"/>
-              <a:t>3/19/18</a:t>
+              <a:t>4/8/18</a:t>
             </a:fld>
             <a:endParaRPr lang="en-US"/>
           </a:p>
@@ -2629,7 +2629,7 @@
           <a:p>
             <a:fld id="{87DE6118-2437-4B30-8E3C-4D2BE6020583}" type="datetimeFigureOut">
               <a:rPr lang="en-US" dirty="0"/>
-              <a:t>3/19/18</a:t>
+              <a:t>4/8/18</a:t>
             </a:fld>
             <a:endParaRPr lang="en-US"/>
           </a:p>
@@ -2741,7 +2741,7 @@
           <a:p>
             <a:fld id="{87DE6118-2437-4B30-8E3C-4D2BE6020583}" type="datetimeFigureOut">
               <a:rPr lang="en-US" dirty="0"/>
-              <a:t>3/19/18</a:t>
+              <a:t>4/8/18</a:t>
             </a:fld>
             <a:endParaRPr lang="en-US"/>
           </a:p>
@@ -2831,7 +2831,7 @@
           <a:p>
             <a:fld id="{87DE6118-2437-4B30-8E3C-4D2BE6020583}" type="datetimeFigureOut">
               <a:rPr lang="en-US" dirty="0"/>
-              <a:t>3/19/18</a:t>
+              <a:t>4/8/18</a:t>
             </a:fld>
             <a:endParaRPr lang="en-US"/>
           </a:p>
@@ -3171,7 +3171,7 @@
             <a:fld id="{87DE6118-2437-4B30-8E3C-4D2BE6020583}" type="datetimeFigureOut">
               <a:rPr lang="en-US" dirty="0"/>
               <a:pPr/>
-              <a:t>3/19/18</a:t>
+              <a:t>4/8/18</a:t>
             </a:fld>
             <a:endParaRPr lang="en-US"/>
           </a:p>
@@ -3554,7 +3554,7 @@
             <a:fld id="{87DE6118-2437-4B30-8E3C-4D2BE6020583}" type="datetimeFigureOut">
               <a:rPr lang="en-US" dirty="0"/>
               <a:pPr/>
-              <a:t>3/19/18</a:t>
+              <a:t>4/8/18</a:t>
             </a:fld>
             <a:endParaRPr lang="en-US"/>
           </a:p>
@@ -3827,7 +3827,7 @@
             <a:fld id="{87DE6118-2437-4B30-8E3C-4D2BE6020583}" type="datetimeFigureOut">
               <a:rPr lang="en-US" dirty="0"/>
               <a:pPr/>
-              <a:t>3/19/18</a:t>
+              <a:t>4/8/18</a:t>
             </a:fld>
             <a:endParaRPr lang="en-US"/>
           </a:p>
@@ -4401,7 +4401,7 @@
         </p:spPr>
         <p:txBody>
           <a:bodyPr>
-            <a:normAutofit fontScale="92500" lnSpcReduction="20000"/>
+            <a:normAutofit fontScale="92500" lnSpcReduction="10000"/>
           </a:bodyPr>
           <a:lstStyle/>
           <a:p>
@@ -5861,14 +5861,14 @@
           <p:nvPr>
             <p:extLst>
               <p:ext uri="{D42A27DB-BD31-4B8C-83A1-F6EECF244321}">
-                <p14:modId xmlns:p14="http://schemas.microsoft.com/office/powerpoint/2010/main" val="840731844"/>
+                <p14:modId xmlns:p14="http://schemas.microsoft.com/office/powerpoint/2010/main" val="15445881"/>
               </p:ext>
             </p:extLst>
           </p:nvPr>
         </p:nvGraphicFramePr>
         <p:xfrm>
           <a:off x="2029040" y="2362200"/>
-          <a:ext cx="9324974" cy="3674472"/>
+          <a:ext cx="9324974" cy="3591468"/>
         </p:xfrm>
         <a:graphic>
           <a:graphicData uri="http://schemas.openxmlformats.org/drawingml/2006/table">
@@ -6107,7 +6107,7 @@
                       </a:pPr>
                       <a:r>
                         <a:rPr lang="en-US" dirty="0"/>
-                        <a:t>Model fitting and cross validation, Testing, Optimization, UI framework integration</a:t>
+                        <a:t>Model fitting and cross validation, Testing, </a:t>
                       </a:r>
                     </a:p>
                   </a:txBody>
@@ -6162,8 +6162,13 @@
                       </a:pPr>
                       <a:r>
                         <a:rPr lang="en-US" dirty="0"/>
-                        <a:t>Re-Testing and finishing, Preparation of Final Presentation</a:t>
+                        <a:t>Optimization, </a:t>
                       </a:r>
+                      <a:r>
+                        <a:rPr lang="en-US"/>
+                        <a:t>UI framework integration</a:t>
+                      </a:r>
+                      <a:endParaRPr lang="en-US" dirty="0"/>
                     </a:p>
                   </a:txBody>
                   <a:tcPr/>
@@ -6183,7 +6188,14 @@
                       <a:pPr>
                         <a:buNone/>
                       </a:pPr>
-                      <a:endParaRPr lang="en-US"/>
+                      <a:r>
+                        <a:rPr lang="en-US" dirty="0" err="1"/>
+                        <a:t>Sprin</a:t>
+                      </a:r>
+                      <a:r>
+                        <a:rPr lang="en-US" dirty="0"/>
+                        <a:t> 5</a:t>
+                      </a:r>
                     </a:p>
                   </a:txBody>
                   <a:tcPr/>
@@ -6193,7 +6205,10 @@
                     <a:bodyPr/>
                     <a:lstStyle/>
                     <a:p>
-                      <a:endParaRPr lang="en-US"/>
+                      <a:r>
+                        <a:rPr lang="en-US" dirty="0"/>
+                        <a:t>04/16/2018 – 04/22/2018</a:t>
+                      </a:r>
                     </a:p>
                   </a:txBody>
                   <a:tcPr/>
@@ -6203,7 +6218,10 @@
                     <a:bodyPr/>
                     <a:lstStyle/>
                     <a:p>
-                      <a:endParaRPr lang="en-US" dirty="0"/>
+                      <a:r>
+                        <a:rPr lang="en-US" dirty="0"/>
+                        <a:t>Re-Testing and finishing, Preparation of Final Presentation</a:t>
+                      </a:r>
                     </a:p>
                   </a:txBody>
                   <a:tcPr/>

</xml_diff>